<commit_message>
updated decks and deleted .idea
</commit_message>
<xml_diff>
--- a/module-1/01-07 Developing the Web API Business Rules/01-07 Developing the Web API Business Rules.pptx
+++ b/module-1/01-07 Developing the Web API Business Rules/01-07 Developing the Web API Business Rules.pptx
@@ -6,13 +6,12 @@
     <p:sldMasterId id="2147483684" r:id="rId2"/>
   </p:sldMasterIdLst>
   <p:notesMasterIdLst>
-    <p:notesMasterId r:id="rId7"/>
+    <p:notesMasterId r:id="rId6"/>
   </p:notesMasterIdLst>
   <p:sldIdLst>
     <p:sldId id="261" r:id="rId3"/>
     <p:sldId id="256" r:id="rId4"/>
-    <p:sldId id="262" r:id="rId5"/>
-    <p:sldId id="257" r:id="rId6"/>
+    <p:sldId id="257" r:id="rId5"/>
   </p:sldIdLst>
   <p:sldSz cx="12192000" cy="6858000"/>
   <p:notesSz cx="6858000" cy="9144000"/>
@@ -201,7 +200,7 @@
           <a:p>
             <a:fld id="{6050CDE0-8281-4F20-AADF-7F31818DD123}" type="datetimeFigureOut">
               <a:rPr lang="en-US" smtClean="0"/>
-              <a:t>9/27/2021</a:t>
+              <a:t>9/28/2021</a:t>
             </a:fld>
             <a:endParaRPr lang="en-US"/>
           </a:p>
@@ -848,7 +847,7 @@
           <a:p>
             <a:fld id="{21C31B38-3FD9-4254-98BC-9CD73FDB3644}" type="datetimeFigureOut">
               <a:rPr lang="en-US" smtClean="0"/>
-              <a:t>9/27/2021</a:t>
+              <a:t>9/28/2021</a:t>
             </a:fld>
             <a:endParaRPr lang="en-US"/>
           </a:p>
@@ -1056,7 +1055,7 @@
           <a:p>
             <a:fld id="{21C31B38-3FD9-4254-98BC-9CD73FDB3644}" type="datetimeFigureOut">
               <a:rPr lang="en-US" smtClean="0"/>
-              <a:t>9/27/2021</a:t>
+              <a:t>9/28/2021</a:t>
             </a:fld>
             <a:endParaRPr lang="en-US"/>
           </a:p>
@@ -1314,7 +1313,7 @@
           <a:p>
             <a:fld id="{21C31B38-3FD9-4254-98BC-9CD73FDB3644}" type="datetimeFigureOut">
               <a:rPr lang="en-US" smtClean="0"/>
-              <a:t>9/27/2021</a:t>
+              <a:t>9/28/2021</a:t>
             </a:fld>
             <a:endParaRPr lang="en-US"/>
           </a:p>
@@ -1554,7 +1553,7 @@
           <a:p>
             <a:fld id="{D088F999-7A4E-6B4F-9FED-EF75B73AD044}" type="datetimeFigureOut">
               <a:rPr lang="en-US" smtClean="0"/>
-              <a:t>9/27/2021</a:t>
+              <a:t>9/28/2021</a:t>
             </a:fld>
             <a:endParaRPr lang="en-US"/>
           </a:p>
@@ -1722,7 +1721,7 @@
           <a:p>
             <a:fld id="{D088F999-7A4E-6B4F-9FED-EF75B73AD044}" type="datetimeFigureOut">
               <a:rPr lang="en-US" smtClean="0"/>
-              <a:t>9/27/2021</a:t>
+              <a:t>9/28/2021</a:t>
             </a:fld>
             <a:endParaRPr lang="en-US"/>
           </a:p>
@@ -1967,7 +1966,7 @@
           <a:p>
             <a:fld id="{D088F999-7A4E-6B4F-9FED-EF75B73AD044}" type="datetimeFigureOut">
               <a:rPr lang="en-US" smtClean="0"/>
-              <a:t>9/27/2021</a:t>
+              <a:t>9/28/2021</a:t>
             </a:fld>
             <a:endParaRPr lang="en-US"/>
           </a:p>
@@ -2252,7 +2251,7 @@
           <a:p>
             <a:fld id="{D088F999-7A4E-6B4F-9FED-EF75B73AD044}" type="datetimeFigureOut">
               <a:rPr lang="en-US" smtClean="0"/>
-              <a:t>9/27/2021</a:t>
+              <a:t>9/28/2021</a:t>
             </a:fld>
             <a:endParaRPr lang="en-US"/>
           </a:p>
@@ -2671,7 +2670,7 @@
           <a:p>
             <a:fld id="{D088F999-7A4E-6B4F-9FED-EF75B73AD044}" type="datetimeFigureOut">
               <a:rPr lang="en-US" smtClean="0"/>
-              <a:t>9/27/2021</a:t>
+              <a:t>9/28/2021</a:t>
             </a:fld>
             <a:endParaRPr lang="en-US"/>
           </a:p>
@@ -2788,7 +2787,7 @@
           <a:p>
             <a:fld id="{D088F999-7A4E-6B4F-9FED-EF75B73AD044}" type="datetimeFigureOut">
               <a:rPr lang="en-US" smtClean="0"/>
-              <a:t>9/27/2021</a:t>
+              <a:t>9/28/2021</a:t>
             </a:fld>
             <a:endParaRPr lang="en-US"/>
           </a:p>
@@ -2883,7 +2882,7 @@
           <a:p>
             <a:fld id="{D088F999-7A4E-6B4F-9FED-EF75B73AD044}" type="datetimeFigureOut">
               <a:rPr lang="en-US" smtClean="0"/>
-              <a:t>9/27/2021</a:t>
+              <a:t>9/28/2021</a:t>
             </a:fld>
             <a:endParaRPr lang="en-US"/>
           </a:p>
@@ -3158,7 +3157,7 @@
           <a:p>
             <a:fld id="{D088F999-7A4E-6B4F-9FED-EF75B73AD044}" type="datetimeFigureOut">
               <a:rPr lang="en-US" smtClean="0"/>
-              <a:t>9/27/2021</a:t>
+              <a:t>9/28/2021</a:t>
             </a:fld>
             <a:endParaRPr lang="en-US"/>
           </a:p>
@@ -3328,7 +3327,7 @@
           <a:p>
             <a:fld id="{21C31B38-3FD9-4254-98BC-9CD73FDB3644}" type="datetimeFigureOut">
               <a:rPr lang="en-US" smtClean="0"/>
-              <a:t>9/27/2021</a:t>
+              <a:t>9/28/2021</a:t>
             </a:fld>
             <a:endParaRPr lang="en-US"/>
           </a:p>
@@ -3580,7 +3579,7 @@
           <a:p>
             <a:fld id="{D088F999-7A4E-6B4F-9FED-EF75B73AD044}" type="datetimeFigureOut">
               <a:rPr lang="en-US" smtClean="0"/>
-              <a:t>9/27/2021</a:t>
+              <a:t>9/28/2021</a:t>
             </a:fld>
             <a:endParaRPr lang="en-US"/>
           </a:p>
@@ -3748,7 +3747,7 @@
           <a:p>
             <a:fld id="{D088F999-7A4E-6B4F-9FED-EF75B73AD044}" type="datetimeFigureOut">
               <a:rPr lang="en-US" smtClean="0"/>
-              <a:t>9/27/2021</a:t>
+              <a:t>9/28/2021</a:t>
             </a:fld>
             <a:endParaRPr lang="en-US"/>
           </a:p>
@@ -3926,7 +3925,7 @@
           <a:p>
             <a:fld id="{D088F999-7A4E-6B4F-9FED-EF75B73AD044}" type="datetimeFigureOut">
               <a:rPr lang="en-US" smtClean="0"/>
-              <a:t>9/27/2021</a:t>
+              <a:t>9/28/2021</a:t>
             </a:fld>
             <a:endParaRPr lang="en-US"/>
           </a:p>
@@ -4263,7 +4262,7 @@
           <a:p>
             <a:fld id="{21C31B38-3FD9-4254-98BC-9CD73FDB3644}" type="datetimeFigureOut">
               <a:rPr lang="en-US" smtClean="0"/>
-              <a:t>9/27/2021</a:t>
+              <a:t>9/28/2021</a:t>
             </a:fld>
             <a:endParaRPr lang="en-US"/>
           </a:p>
@@ -4538,7 +4537,7 @@
           <a:p>
             <a:fld id="{21C31B38-3FD9-4254-98BC-9CD73FDB3644}" type="datetimeFigureOut">
               <a:rPr lang="en-US" smtClean="0"/>
-              <a:t>9/27/2021</a:t>
+              <a:t>9/28/2021</a:t>
             </a:fld>
             <a:endParaRPr lang="en-US"/>
           </a:p>
@@ -4921,7 +4920,7 @@
           <a:p>
             <a:fld id="{21C31B38-3FD9-4254-98BC-9CD73FDB3644}" type="datetimeFigureOut">
               <a:rPr lang="en-US" smtClean="0"/>
-              <a:t>9/27/2021</a:t>
+              <a:t>9/28/2021</a:t>
             </a:fld>
             <a:endParaRPr lang="en-US"/>
           </a:p>
@@ -5039,7 +5038,7 @@
           <a:p>
             <a:fld id="{21C31B38-3FD9-4254-98BC-9CD73FDB3644}" type="datetimeFigureOut">
               <a:rPr lang="en-US" smtClean="0"/>
-              <a:t>9/27/2021</a:t>
+              <a:t>9/28/2021</a:t>
             </a:fld>
             <a:endParaRPr lang="en-US"/>
           </a:p>
@@ -5212,7 +5211,7 @@
           <a:p>
             <a:fld id="{21C31B38-3FD9-4254-98BC-9CD73FDB3644}" type="datetimeFigureOut">
               <a:rPr lang="en-US" smtClean="0"/>
-              <a:t>9/27/2021</a:t>
+              <a:t>9/28/2021</a:t>
             </a:fld>
             <a:endParaRPr lang="en-US"/>
           </a:p>
@@ -5568,7 +5567,7 @@
           <a:p>
             <a:fld id="{21C31B38-3FD9-4254-98BC-9CD73FDB3644}" type="datetimeFigureOut">
               <a:rPr lang="en-US" smtClean="0"/>
-              <a:t>9/27/2021</a:t>
+              <a:t>9/28/2021</a:t>
             </a:fld>
             <a:endParaRPr lang="en-US"/>
           </a:p>
@@ -5916,7 +5915,7 @@
           <a:p>
             <a:fld id="{21C31B38-3FD9-4254-98BC-9CD73FDB3644}" type="datetimeFigureOut">
               <a:rPr lang="en-US" smtClean="0"/>
-              <a:t>9/27/2021</a:t>
+              <a:t>9/28/2021</a:t>
             </a:fld>
             <a:endParaRPr lang="en-US"/>
           </a:p>
@@ -6227,7 +6226,7 @@
           <a:p>
             <a:fld id="{21C31B38-3FD9-4254-98BC-9CD73FDB3644}" type="datetimeFigureOut">
               <a:rPr lang="en-US" smtClean="0"/>
-              <a:t>9/27/2021</a:t>
+              <a:t>9/28/2021</a:t>
             </a:fld>
             <a:endParaRPr lang="en-US"/>
           </a:p>
@@ -6893,7 +6892,7 @@
           <a:p>
             <a:fld id="{D088F999-7A4E-6B4F-9FED-EF75B73AD044}" type="datetimeFigureOut">
               <a:rPr lang="en-US" smtClean="0"/>
-              <a:t>9/27/2021</a:t>
+              <a:t>9/28/2021</a:t>
             </a:fld>
             <a:endParaRPr lang="en-US"/>
           </a:p>
@@ -7825,94 +7824,6 @@
 </file>
 
 <file path=ppt/slides/slide3.xml><?xml version="1.0" encoding="utf-8"?>
-<p:sld xmlns:a="http://schemas.openxmlformats.org/drawingml/2006/main" xmlns:r="http://schemas.openxmlformats.org/officeDocument/2006/relationships" xmlns:p="http://schemas.openxmlformats.org/presentationml/2006/main">
-  <p:cSld>
-    <p:spTree>
-      <p:nvGrpSpPr>
-        <p:cNvPr id="1" name=""/>
-        <p:cNvGrpSpPr/>
-        <p:nvPr/>
-      </p:nvGrpSpPr>
-      <p:grpSpPr>
-        <a:xfrm>
-          <a:off x="0" y="0"/>
-          <a:ext cx="0" cy="0"/>
-          <a:chOff x="0" y="0"/>
-          <a:chExt cx="0" cy="0"/>
-        </a:xfrm>
-      </p:grpSpPr>
-      <p:sp>
-        <p:nvSpPr>
-          <p:cNvPr id="4" name="Title 3">
-            <a:extLst>
-              <a:ext uri="{FF2B5EF4-FFF2-40B4-BE49-F238E27FC236}">
-                <a16:creationId xmlns:a16="http://schemas.microsoft.com/office/drawing/2014/main" id="{AA63D02E-4FDE-451B-A802-D9462AE671CA}"/>
-              </a:ext>
-            </a:extLst>
-          </p:cNvPr>
-          <p:cNvSpPr>
-            <a:spLocks noGrp="1"/>
-          </p:cNvSpPr>
-          <p:nvPr>
-            <p:ph type="title"/>
-          </p:nvPr>
-        </p:nvSpPr>
-        <p:spPr/>
-        <p:txBody>
-          <a:bodyPr/>
-          <a:lstStyle/>
-          <a:p>
-            <a:r>
-              <a:rPr lang="en-US" dirty="0"/>
-              <a:t>Transition from API Endpoints to DB</a:t>
-            </a:r>
-          </a:p>
-        </p:txBody>
-      </p:sp>
-      <p:pic>
-        <p:nvPicPr>
-          <p:cNvPr id="6" name="Picture 5">
-            <a:extLst>
-              <a:ext uri="{FF2B5EF4-FFF2-40B4-BE49-F238E27FC236}">
-                <a16:creationId xmlns:a16="http://schemas.microsoft.com/office/drawing/2014/main" id="{BF4DFC02-E01A-46CB-8864-28F5EBFC9972}"/>
-              </a:ext>
-            </a:extLst>
-          </p:cNvPr>
-          <p:cNvPicPr>
-            <a:picLocks noChangeAspect="1"/>
-          </p:cNvPicPr>
-          <p:nvPr/>
-        </p:nvPicPr>
-        <p:blipFill>
-          <a:blip r:embed="rId2"/>
-          <a:stretch>
-            <a:fillRect/>
-          </a:stretch>
-        </p:blipFill>
-        <p:spPr>
-          <a:xfrm>
-            <a:off x="1097280" y="1995487"/>
-            <a:ext cx="10071404" cy="3906549"/>
-          </a:xfrm>
-          <a:prstGeom prst="rect">
-            <a:avLst/>
-          </a:prstGeom>
-        </p:spPr>
-      </p:pic>
-    </p:spTree>
-    <p:extLst>
-      <p:ext uri="{BB962C8B-B14F-4D97-AF65-F5344CB8AC3E}">
-        <p14:creationId xmlns:p14="http://schemas.microsoft.com/office/powerpoint/2010/main" val="1274677540"/>
-      </p:ext>
-    </p:extLst>
-  </p:cSld>
-  <p:clrMapOvr>
-    <a:masterClrMapping/>
-  </p:clrMapOvr>
-</p:sld>
-</file>
-
-<file path=ppt/slides/slide4.xml><?xml version="1.0" encoding="utf-8"?>
 <p:sld xmlns:a="http://schemas.openxmlformats.org/drawingml/2006/main" xmlns:r="http://schemas.openxmlformats.org/officeDocument/2006/relationships" xmlns:p="http://schemas.openxmlformats.org/presentationml/2006/main">
   <p:cSld>
     <p:spTree>

</xml_diff>